<commit_message>
Update weekly pres draft
</commit_message>
<xml_diff>
--- a/presentations/weekly_meetings/3_7_24.pptx
+++ b/presentations/weekly_meetings/3_7_24.pptx
@@ -5,15 +5,17 @@
     <p:sldMasterId id="2147483648" r:id="rId1"/>
   </p:sldMasterIdLst>
   <p:notesMasterIdLst>
-    <p:notesMasterId r:id="rId8"/>
+    <p:notesMasterId r:id="rId10"/>
   </p:notesMasterIdLst>
   <p:sldIdLst>
     <p:sldId id="477" r:id="rId2"/>
     <p:sldId id="499" r:id="rId3"/>
     <p:sldId id="547" r:id="rId4"/>
     <p:sldId id="546" r:id="rId5"/>
-    <p:sldId id="548" r:id="rId6"/>
-    <p:sldId id="545" r:id="rId7"/>
+    <p:sldId id="549" r:id="rId6"/>
+    <p:sldId id="550" r:id="rId7"/>
+    <p:sldId id="548" r:id="rId8"/>
+    <p:sldId id="545" r:id="rId9"/>
   </p:sldIdLst>
   <p:sldSz cx="12192000" cy="6858000"/>
   <p:notesSz cx="6858000" cy="9144000"/>
@@ -213,7 +215,7 @@
           <a:p>
             <a:fld id="{E933A773-0DCE-3544-BB67-D5FA58DF903C}" type="datetimeFigureOut">
               <a:rPr lang="en-US" smtClean="0"/>
-              <a:t>3/1/24</a:t>
+              <a:t>3/5/24</a:t>
             </a:fld>
             <a:endParaRPr lang="en-US"/>
           </a:p>
@@ -1072,6 +1074,10 @@
           <a:bodyPr/>
           <a:lstStyle/>
           <a:p>
+            <a:pPr marL="171450" indent="-171450">
+              <a:buFontTx/>
+              <a:buChar char="-"/>
+            </a:pPr>
             <a:endParaRPr lang="en-US" b="0" dirty="0">
               <a:solidFill>
                 <a:srgbClr val="CCCCCC"/>
@@ -1114,7 +1120,7 @@
     </p:spTree>
     <p:extLst>
       <p:ext uri="{BB962C8B-B14F-4D97-AF65-F5344CB8AC3E}">
-        <p14:creationId xmlns:p14="http://schemas.microsoft.com/office/powerpoint/2010/main" val="3687655026"/>
+        <p14:creationId xmlns:p14="http://schemas.microsoft.com/office/powerpoint/2010/main" val="566002076"/>
       </p:ext>
     </p:extLst>
   </p:cSld>
@@ -1186,6 +1192,28 @@
           <a:bodyPr/>
           <a:lstStyle/>
           <a:p>
+            <a:r>
+              <a:rPr lang="en-US" sz="1200" dirty="0"/>
+              <a:t>Seurat scores similar between Seurat CD4 TCM - </a:t>
+            </a:r>
+            <a:r>
+              <a:rPr lang="en-US" sz="1200" dirty="0" err="1"/>
+              <a:t>SingleR</a:t>
+            </a:r>
+            <a:r>
+              <a:rPr lang="en-US" sz="1200" dirty="0"/>
+              <a:t> memory Tregs and Treg-memory Tregs, little lower for Treg-memory Tregs…</a:t>
+            </a:r>
+          </a:p>
+          <a:p>
+            <a:r>
+              <a:rPr lang="en-US" sz="1200" dirty="0" err="1"/>
+              <a:t>SingleR</a:t>
+            </a:r>
+            <a:r>
+              <a:rPr lang="en-US" sz="1200" dirty="0"/>
+              <a:t> scores don’t seem that bad either for memory Tregs… i.e. clear high score block in score heatmap for memory Tregs</a:t>
+            </a:r>
             <a:endParaRPr lang="en-US" b="0" dirty="0">
               <a:solidFill>
                 <a:srgbClr val="CCCCCC"/>
@@ -1194,6 +1222,321 @@
               <a:latin typeface="Menlo" panose="020B0609030804020204" pitchFamily="49" charset="0"/>
             </a:endParaRPr>
           </a:p>
+          <a:p>
+            <a:endParaRPr lang="en-US" b="0" dirty="0">
+              <a:solidFill>
+                <a:srgbClr val="CCCCCC"/>
+              </a:solidFill>
+              <a:effectLst/>
+              <a:latin typeface="Menlo" panose="020B0609030804020204" pitchFamily="49" charset="0"/>
+            </a:endParaRPr>
+          </a:p>
+          <a:p>
+            <a:r>
+              <a:rPr lang="en-US" b="0" dirty="0">
+                <a:solidFill>
+                  <a:srgbClr val="CCCCCC"/>
+                </a:solidFill>
+                <a:effectLst/>
+                <a:latin typeface="Menlo" panose="020B0609030804020204" pitchFamily="49" charset="0"/>
+              </a:rPr>
+              <a:t>#</a:t>
+            </a:r>
+            <a:r>
+              <a:rPr lang="en-US" b="0" dirty="0" err="1">
+                <a:solidFill>
+                  <a:srgbClr val="CCCCCC"/>
+                </a:solidFill>
+                <a:effectLst/>
+                <a:latin typeface="Menlo" panose="020B0609030804020204" pitchFamily="49" charset="0"/>
+              </a:rPr>
+              <a:t>luoma</a:t>
+            </a:r>
+            <a:endParaRPr lang="en-US" b="0" dirty="0">
+              <a:solidFill>
+                <a:srgbClr val="CCCCCC"/>
+              </a:solidFill>
+              <a:effectLst/>
+              <a:latin typeface="Menlo" panose="020B0609030804020204" pitchFamily="49" charset="0"/>
+            </a:endParaRPr>
+          </a:p>
+          <a:p>
+            <a:r>
+              <a:rPr lang="en-US" b="0" dirty="0">
+                <a:solidFill>
+                  <a:srgbClr val="CCCCCC"/>
+                </a:solidFill>
+                <a:effectLst/>
+                <a:latin typeface="Menlo" panose="020B0609030804020204" pitchFamily="49" charset="0"/>
+              </a:rPr>
+              <a:t># </a:t>
+            </a:r>
+            <a:r>
+              <a:rPr lang="en-US" b="0" dirty="0" err="1">
+                <a:solidFill>
+                  <a:srgbClr val="CCCCCC"/>
+                </a:solidFill>
+                <a:effectLst/>
+                <a:latin typeface="Menlo" panose="020B0609030804020204" pitchFamily="49" charset="0"/>
+              </a:rPr>
+              <a:t>padj</a:t>
+            </a:r>
+            <a:endParaRPr lang="en-US" b="0" dirty="0">
+              <a:solidFill>
+                <a:srgbClr val="CCCCCC"/>
+              </a:solidFill>
+              <a:effectLst/>
+              <a:latin typeface="Menlo" panose="020B0609030804020204" pitchFamily="49" charset="0"/>
+            </a:endParaRPr>
+          </a:p>
+          <a:p>
+            <a:r>
+              <a:rPr lang="en-US" b="0" dirty="0">
+                <a:solidFill>
+                  <a:srgbClr val="CCCCCC"/>
+                </a:solidFill>
+                <a:effectLst/>
+                <a:latin typeface="Menlo" panose="020B0609030804020204" pitchFamily="49" charset="0"/>
+              </a:rPr>
+              <a:t># memory Treg: 0.01</a:t>
+            </a:r>
+          </a:p>
+          <a:p>
+            <a:r>
+              <a:rPr lang="en-US" b="0" dirty="0">
+                <a:solidFill>
+                  <a:srgbClr val="CCCCCC"/>
+                </a:solidFill>
+                <a:effectLst/>
+                <a:latin typeface="Menlo" panose="020B0609030804020204" pitchFamily="49" charset="0"/>
+              </a:rPr>
+              <a:t># Th1_17: 0.06</a:t>
+            </a:r>
+          </a:p>
+          <a:p>
+            <a:r>
+              <a:rPr lang="en-US" b="0" dirty="0">
+                <a:solidFill>
+                  <a:srgbClr val="CCCCCC"/>
+                </a:solidFill>
+                <a:effectLst/>
+                <a:latin typeface="Menlo" panose="020B0609030804020204" pitchFamily="49" charset="0"/>
+              </a:rPr>
+              <a:t># naive stimulated: 0.09</a:t>
+            </a:r>
+          </a:p>
+          <a:p>
+            <a:endParaRPr lang="en-US" b="0" dirty="0">
+              <a:solidFill>
+                <a:srgbClr val="CCCCCC"/>
+              </a:solidFill>
+              <a:effectLst/>
+              <a:latin typeface="Menlo" panose="020B0609030804020204" pitchFamily="49" charset="0"/>
+            </a:endParaRPr>
+          </a:p>
+          <a:p>
+            <a:r>
+              <a:rPr lang="en-US" b="0" dirty="0">
+                <a:solidFill>
+                  <a:srgbClr val="CCCCCC"/>
+                </a:solidFill>
+                <a:effectLst/>
+                <a:latin typeface="Menlo" panose="020B0609030804020204" pitchFamily="49" charset="0"/>
+              </a:rPr>
+              <a:t># </a:t>
+            </a:r>
+            <a:r>
+              <a:rPr lang="en-US" b="0" dirty="0" err="1">
+                <a:solidFill>
+                  <a:srgbClr val="CCCCCC"/>
+                </a:solidFill>
+                <a:effectLst/>
+                <a:latin typeface="Menlo" panose="020B0609030804020204" pitchFamily="49" charset="0"/>
+              </a:rPr>
+              <a:t>thomas</a:t>
+            </a:r>
+            <a:endParaRPr lang="en-US" b="0" dirty="0">
+              <a:solidFill>
+                <a:srgbClr val="CCCCCC"/>
+              </a:solidFill>
+              <a:effectLst/>
+              <a:latin typeface="Menlo" panose="020B0609030804020204" pitchFamily="49" charset="0"/>
+            </a:endParaRPr>
+          </a:p>
+          <a:p>
+            <a:r>
+              <a:rPr lang="en-US" b="0" dirty="0">
+                <a:solidFill>
+                  <a:srgbClr val="CCCCCC"/>
+                </a:solidFill>
+                <a:effectLst/>
+                <a:latin typeface="Menlo" panose="020B0609030804020204" pitchFamily="49" charset="0"/>
+              </a:rPr>
+              <a:t># </a:t>
+            </a:r>
+            <a:r>
+              <a:rPr lang="en-US" b="0" dirty="0" err="1">
+                <a:solidFill>
+                  <a:srgbClr val="CCCCCC"/>
+                </a:solidFill>
+                <a:effectLst/>
+                <a:latin typeface="Menlo" panose="020B0609030804020204" pitchFamily="49" charset="0"/>
+              </a:rPr>
+              <a:t>padj</a:t>
+            </a:r>
+            <a:endParaRPr lang="en-US" b="0" dirty="0">
+              <a:solidFill>
+                <a:srgbClr val="CCCCCC"/>
+              </a:solidFill>
+              <a:effectLst/>
+              <a:latin typeface="Menlo" panose="020B0609030804020204" pitchFamily="49" charset="0"/>
+            </a:endParaRPr>
+          </a:p>
+          <a:p>
+            <a:r>
+              <a:rPr lang="en-US" b="0" dirty="0">
+                <a:solidFill>
+                  <a:srgbClr val="CCCCCC"/>
+                </a:solidFill>
+                <a:effectLst/>
+                <a:latin typeface="Menlo" panose="020B0609030804020204" pitchFamily="49" charset="0"/>
+              </a:rPr>
+              <a:t># memory Treg: 0.03</a:t>
+            </a:r>
+          </a:p>
+          <a:p>
+            <a:endParaRPr lang="en-US" b="0" dirty="0">
+              <a:solidFill>
+                <a:srgbClr val="CCCCCC"/>
+              </a:solidFill>
+              <a:effectLst/>
+              <a:latin typeface="Menlo" panose="020B0609030804020204" pitchFamily="49" charset="0"/>
+            </a:endParaRPr>
+          </a:p>
+          <a:p>
+            <a:r>
+              <a:rPr lang="en-US" b="0" dirty="0">
+                <a:solidFill>
+                  <a:srgbClr val="CCCCCC"/>
+                </a:solidFill>
+                <a:effectLst/>
+                <a:latin typeface="Menlo" panose="020B0609030804020204" pitchFamily="49" charset="0"/>
+              </a:rPr>
+              <a:t>Thomas: Seurat called TCM is most abundant </a:t>
+            </a:r>
+            <a:r>
+              <a:rPr lang="en-US" b="0" dirty="0" err="1">
+                <a:solidFill>
+                  <a:srgbClr val="CCCCCC"/>
+                </a:solidFill>
+                <a:effectLst/>
+                <a:latin typeface="Menlo" panose="020B0609030804020204" pitchFamily="49" charset="0"/>
+              </a:rPr>
+              <a:t>SingleR</a:t>
+            </a:r>
+            <a:r>
+              <a:rPr lang="en-US" b="0" dirty="0">
+                <a:solidFill>
+                  <a:srgbClr val="CCCCCC"/>
+                </a:solidFill>
+                <a:effectLst/>
+                <a:latin typeface="Menlo" panose="020B0609030804020204" pitchFamily="49" charset="0"/>
+              </a:rPr>
+              <a:t> memory Treg (~4k), then Seurat Treg </a:t>
+            </a:r>
+            <a:r>
+              <a:rPr lang="en-US" b="0" dirty="0" err="1">
+                <a:solidFill>
+                  <a:srgbClr val="CCCCCC"/>
+                </a:solidFill>
+                <a:effectLst/>
+                <a:latin typeface="Menlo" panose="020B0609030804020204" pitchFamily="49" charset="0"/>
+              </a:rPr>
+              <a:t>SingleR</a:t>
+            </a:r>
+            <a:r>
+              <a:rPr lang="en-US" b="0" dirty="0">
+                <a:solidFill>
+                  <a:srgbClr val="CCCCCC"/>
+                </a:solidFill>
+                <a:effectLst/>
+                <a:latin typeface="Menlo" panose="020B0609030804020204" pitchFamily="49" charset="0"/>
+              </a:rPr>
+              <a:t> memory Treg (~700)</a:t>
+            </a:r>
+          </a:p>
+          <a:p>
+            <a:r>
+              <a:rPr lang="en-US" b="0" dirty="0">
+                <a:solidFill>
+                  <a:srgbClr val="CCCCCC"/>
+                </a:solidFill>
+                <a:effectLst/>
+                <a:latin typeface="Menlo" panose="020B0609030804020204" pitchFamily="49" charset="0"/>
+              </a:rPr>
+              <a:t>Same for </a:t>
+            </a:r>
+            <a:r>
+              <a:rPr lang="en-US" b="0" dirty="0" err="1">
+                <a:solidFill>
+                  <a:srgbClr val="CCCCCC"/>
+                </a:solidFill>
+                <a:effectLst/>
+                <a:latin typeface="Menlo" panose="020B0609030804020204" pitchFamily="49" charset="0"/>
+              </a:rPr>
+              <a:t>Luoma</a:t>
+            </a:r>
+            <a:r>
+              <a:rPr lang="en-US" b="0" dirty="0">
+                <a:solidFill>
+                  <a:srgbClr val="CCCCCC"/>
+                </a:solidFill>
+                <a:effectLst/>
+                <a:latin typeface="Menlo" panose="020B0609030804020204" pitchFamily="49" charset="0"/>
+              </a:rPr>
+              <a:t>: Seurat TCM ~ 2.3k for </a:t>
+            </a:r>
+            <a:r>
+              <a:rPr lang="en-US" b="0" dirty="0" err="1">
+                <a:solidFill>
+                  <a:srgbClr val="CCCCCC"/>
+                </a:solidFill>
+                <a:effectLst/>
+                <a:latin typeface="Menlo" panose="020B0609030804020204" pitchFamily="49" charset="0"/>
+              </a:rPr>
+              <a:t>SingleR</a:t>
+            </a:r>
+            <a:r>
+              <a:rPr lang="en-US" b="0" dirty="0">
+                <a:solidFill>
+                  <a:srgbClr val="CCCCCC"/>
+                </a:solidFill>
+                <a:effectLst/>
+                <a:latin typeface="Menlo" panose="020B0609030804020204" pitchFamily="49" charset="0"/>
+              </a:rPr>
+              <a:t> memory Treg, and then Seurat Treg ~1.4k for </a:t>
+            </a:r>
+            <a:r>
+              <a:rPr lang="en-US" b="0" dirty="0" err="1">
+                <a:solidFill>
+                  <a:srgbClr val="CCCCCC"/>
+                </a:solidFill>
+                <a:effectLst/>
+                <a:latin typeface="Menlo" panose="020B0609030804020204" pitchFamily="49" charset="0"/>
+              </a:rPr>
+              <a:t>SingleR</a:t>
+            </a:r>
+            <a:r>
+              <a:rPr lang="en-US" b="0" dirty="0">
+                <a:solidFill>
+                  <a:srgbClr val="CCCCCC"/>
+                </a:solidFill>
+                <a:effectLst/>
+                <a:latin typeface="Menlo" panose="020B0609030804020204" pitchFamily="49" charset="0"/>
+              </a:rPr>
+              <a:t> memory Treg</a:t>
+            </a:r>
+          </a:p>
         </p:txBody>
       </p:sp>
       <p:sp>
@@ -1220,6 +1563,234 @@
             <a:fld id="{061BAA8C-FDC6-D345-B4E0-3B02449209FB}" type="slidenum">
               <a:rPr lang="en-US" smtClean="0"/>
               <a:t>6</a:t>
+            </a:fld>
+            <a:endParaRPr lang="en-US"/>
+          </a:p>
+        </p:txBody>
+      </p:sp>
+    </p:spTree>
+    <p:extLst>
+      <p:ext uri="{BB962C8B-B14F-4D97-AF65-F5344CB8AC3E}">
+        <p14:creationId xmlns:p14="http://schemas.microsoft.com/office/powerpoint/2010/main" val="2328426750"/>
+      </p:ext>
+    </p:extLst>
+  </p:cSld>
+  <p:clrMapOvr>
+    <a:masterClrMapping/>
+  </p:clrMapOvr>
+</p:notes>
+</file>
+
+<file path=ppt/notesSlides/notesSlide7.xml><?xml version="1.0" encoding="utf-8"?>
+<p:notes xmlns:a="http://schemas.openxmlformats.org/drawingml/2006/main" xmlns:r="http://schemas.openxmlformats.org/officeDocument/2006/relationships" xmlns:p="http://schemas.openxmlformats.org/presentationml/2006/main">
+  <p:cSld>
+    <p:spTree>
+      <p:nvGrpSpPr>
+        <p:cNvPr id="1" name="">
+          <a:extLst>
+            <a:ext uri="{FF2B5EF4-FFF2-40B4-BE49-F238E27FC236}">
+              <a16:creationId xmlns:a16="http://schemas.microsoft.com/office/drawing/2014/main" id="{3415C166-0F50-E043-8950-9F266C4565AE}"/>
+            </a:ext>
+          </a:extLst>
+        </p:cNvPr>
+        <p:cNvGrpSpPr/>
+        <p:nvPr/>
+      </p:nvGrpSpPr>
+      <p:grpSpPr>
+        <a:xfrm>
+          <a:off x="0" y="0"/>
+          <a:ext cx="0" cy="0"/>
+          <a:chOff x="0" y="0"/>
+          <a:chExt cx="0" cy="0"/>
+        </a:xfrm>
+      </p:grpSpPr>
+      <p:sp>
+        <p:nvSpPr>
+          <p:cNvPr id="2" name="Slide Image Placeholder 1">
+            <a:extLst>
+              <a:ext uri="{FF2B5EF4-FFF2-40B4-BE49-F238E27FC236}">
+                <a16:creationId xmlns:a16="http://schemas.microsoft.com/office/drawing/2014/main" id="{1E497E09-6D11-D0BA-D2D1-5B08FB997731}"/>
+              </a:ext>
+            </a:extLst>
+          </p:cNvPr>
+          <p:cNvSpPr>
+            <a:spLocks noGrp="1" noRot="1" noChangeAspect="1"/>
+          </p:cNvSpPr>
+          <p:nvPr>
+            <p:ph type="sldImg"/>
+          </p:nvPr>
+        </p:nvSpPr>
+        <p:spPr/>
+      </p:sp>
+      <p:sp>
+        <p:nvSpPr>
+          <p:cNvPr id="3" name="Notes Placeholder 2">
+            <a:extLst>
+              <a:ext uri="{FF2B5EF4-FFF2-40B4-BE49-F238E27FC236}">
+                <a16:creationId xmlns:a16="http://schemas.microsoft.com/office/drawing/2014/main" id="{9336C4A5-58A4-D062-54A6-1D67A978E992}"/>
+              </a:ext>
+            </a:extLst>
+          </p:cNvPr>
+          <p:cNvSpPr>
+            <a:spLocks noGrp="1"/>
+          </p:cNvSpPr>
+          <p:nvPr>
+            <p:ph type="body" idx="1"/>
+          </p:nvPr>
+        </p:nvSpPr>
+        <p:spPr/>
+        <p:txBody>
+          <a:bodyPr/>
+          <a:lstStyle/>
+          <a:p>
+            <a:endParaRPr lang="en-US" b="0" dirty="0">
+              <a:solidFill>
+                <a:srgbClr val="CCCCCC"/>
+              </a:solidFill>
+              <a:effectLst/>
+              <a:latin typeface="Menlo" panose="020B0609030804020204" pitchFamily="49" charset="0"/>
+            </a:endParaRPr>
+          </a:p>
+        </p:txBody>
+      </p:sp>
+      <p:sp>
+        <p:nvSpPr>
+          <p:cNvPr id="4" name="Slide Number Placeholder 3">
+            <a:extLst>
+              <a:ext uri="{FF2B5EF4-FFF2-40B4-BE49-F238E27FC236}">
+                <a16:creationId xmlns:a16="http://schemas.microsoft.com/office/drawing/2014/main" id="{9F3FD3E1-ECA8-7789-76B9-A150DB6276EE}"/>
+              </a:ext>
+            </a:extLst>
+          </p:cNvPr>
+          <p:cNvSpPr>
+            <a:spLocks noGrp="1"/>
+          </p:cNvSpPr>
+          <p:nvPr>
+            <p:ph type="sldNum" sz="quarter" idx="5"/>
+          </p:nvPr>
+        </p:nvSpPr>
+        <p:spPr/>
+        <p:txBody>
+          <a:bodyPr/>
+          <a:lstStyle/>
+          <a:p>
+            <a:fld id="{061BAA8C-FDC6-D345-B4E0-3B02449209FB}" type="slidenum">
+              <a:rPr lang="en-US" smtClean="0"/>
+              <a:t>7</a:t>
+            </a:fld>
+            <a:endParaRPr lang="en-US"/>
+          </a:p>
+        </p:txBody>
+      </p:sp>
+    </p:spTree>
+    <p:extLst>
+      <p:ext uri="{BB962C8B-B14F-4D97-AF65-F5344CB8AC3E}">
+        <p14:creationId xmlns:p14="http://schemas.microsoft.com/office/powerpoint/2010/main" val="3687655026"/>
+      </p:ext>
+    </p:extLst>
+  </p:cSld>
+  <p:clrMapOvr>
+    <a:masterClrMapping/>
+  </p:clrMapOvr>
+</p:notes>
+</file>
+
+<file path=ppt/notesSlides/notesSlide8.xml><?xml version="1.0" encoding="utf-8"?>
+<p:notes xmlns:a="http://schemas.openxmlformats.org/drawingml/2006/main" xmlns:r="http://schemas.openxmlformats.org/officeDocument/2006/relationships" xmlns:p="http://schemas.openxmlformats.org/presentationml/2006/main">
+  <p:cSld>
+    <p:spTree>
+      <p:nvGrpSpPr>
+        <p:cNvPr id="1" name="">
+          <a:extLst>
+            <a:ext uri="{FF2B5EF4-FFF2-40B4-BE49-F238E27FC236}">
+              <a16:creationId xmlns:a16="http://schemas.microsoft.com/office/drawing/2014/main" id="{3415C166-0F50-E043-8950-9F266C4565AE}"/>
+            </a:ext>
+          </a:extLst>
+        </p:cNvPr>
+        <p:cNvGrpSpPr/>
+        <p:nvPr/>
+      </p:nvGrpSpPr>
+      <p:grpSpPr>
+        <a:xfrm>
+          <a:off x="0" y="0"/>
+          <a:ext cx="0" cy="0"/>
+          <a:chOff x="0" y="0"/>
+          <a:chExt cx="0" cy="0"/>
+        </a:xfrm>
+      </p:grpSpPr>
+      <p:sp>
+        <p:nvSpPr>
+          <p:cNvPr id="2" name="Slide Image Placeholder 1">
+            <a:extLst>
+              <a:ext uri="{FF2B5EF4-FFF2-40B4-BE49-F238E27FC236}">
+                <a16:creationId xmlns:a16="http://schemas.microsoft.com/office/drawing/2014/main" id="{1E497E09-6D11-D0BA-D2D1-5B08FB997731}"/>
+              </a:ext>
+            </a:extLst>
+          </p:cNvPr>
+          <p:cNvSpPr>
+            <a:spLocks noGrp="1" noRot="1" noChangeAspect="1"/>
+          </p:cNvSpPr>
+          <p:nvPr>
+            <p:ph type="sldImg"/>
+          </p:nvPr>
+        </p:nvSpPr>
+        <p:spPr/>
+      </p:sp>
+      <p:sp>
+        <p:nvSpPr>
+          <p:cNvPr id="3" name="Notes Placeholder 2">
+            <a:extLst>
+              <a:ext uri="{FF2B5EF4-FFF2-40B4-BE49-F238E27FC236}">
+                <a16:creationId xmlns:a16="http://schemas.microsoft.com/office/drawing/2014/main" id="{9336C4A5-58A4-D062-54A6-1D67A978E992}"/>
+              </a:ext>
+            </a:extLst>
+          </p:cNvPr>
+          <p:cNvSpPr>
+            <a:spLocks noGrp="1"/>
+          </p:cNvSpPr>
+          <p:nvPr>
+            <p:ph type="body" idx="1"/>
+          </p:nvPr>
+        </p:nvSpPr>
+        <p:spPr/>
+        <p:txBody>
+          <a:bodyPr/>
+          <a:lstStyle/>
+          <a:p>
+            <a:endParaRPr lang="en-US" b="0" dirty="0">
+              <a:solidFill>
+                <a:srgbClr val="CCCCCC"/>
+              </a:solidFill>
+              <a:effectLst/>
+              <a:latin typeface="Menlo" panose="020B0609030804020204" pitchFamily="49" charset="0"/>
+            </a:endParaRPr>
+          </a:p>
+        </p:txBody>
+      </p:sp>
+      <p:sp>
+        <p:nvSpPr>
+          <p:cNvPr id="4" name="Slide Number Placeholder 3">
+            <a:extLst>
+              <a:ext uri="{FF2B5EF4-FFF2-40B4-BE49-F238E27FC236}">
+                <a16:creationId xmlns:a16="http://schemas.microsoft.com/office/drawing/2014/main" id="{9F3FD3E1-ECA8-7789-76B9-A150DB6276EE}"/>
+              </a:ext>
+            </a:extLst>
+          </p:cNvPr>
+          <p:cNvSpPr>
+            <a:spLocks noGrp="1"/>
+          </p:cNvSpPr>
+          <p:nvPr>
+            <p:ph type="sldNum" sz="quarter" idx="5"/>
+          </p:nvPr>
+        </p:nvSpPr>
+        <p:spPr/>
+        <p:txBody>
+          <a:bodyPr/>
+          <a:lstStyle/>
+          <a:p>
+            <a:fld id="{061BAA8C-FDC6-D345-B4E0-3B02449209FB}" type="slidenum">
+              <a:rPr lang="en-US" smtClean="0"/>
+              <a:t>8</a:t>
             </a:fld>
             <a:endParaRPr lang="en-US"/>
           </a:p>
@@ -1385,7 +1956,7 @@
           <a:p>
             <a:fld id="{80FC6068-BAFB-FC44-B9D8-F4B3BB105DE6}" type="datetimeFigureOut">
               <a:rPr lang="en-US" smtClean="0"/>
-              <a:t>3/1/24</a:t>
+              <a:t>3/5/24</a:t>
             </a:fld>
             <a:endParaRPr lang="en-US"/>
           </a:p>
@@ -1583,7 +2154,7 @@
           <a:p>
             <a:fld id="{80FC6068-BAFB-FC44-B9D8-F4B3BB105DE6}" type="datetimeFigureOut">
               <a:rPr lang="en-US" smtClean="0"/>
-              <a:t>3/1/24</a:t>
+              <a:t>3/5/24</a:t>
             </a:fld>
             <a:endParaRPr lang="en-US"/>
           </a:p>
@@ -1791,7 +2362,7 @@
           <a:p>
             <a:fld id="{80FC6068-BAFB-FC44-B9D8-F4B3BB105DE6}" type="datetimeFigureOut">
               <a:rPr lang="en-US" smtClean="0"/>
-              <a:t>3/1/24</a:t>
+              <a:t>3/5/24</a:t>
             </a:fld>
             <a:endParaRPr lang="en-US"/>
           </a:p>
@@ -1995,7 +2566,7 @@
           <a:p>
             <a:fld id="{80FC6068-BAFB-FC44-B9D8-F4B3BB105DE6}" type="datetimeFigureOut">
               <a:rPr lang="en-US" smtClean="0"/>
-              <a:t>3/1/24</a:t>
+              <a:t>3/5/24</a:t>
             </a:fld>
             <a:endParaRPr lang="en-US"/>
           </a:p>
@@ -2286,7 +2857,7 @@
           <a:p>
             <a:fld id="{80FC6068-BAFB-FC44-B9D8-F4B3BB105DE6}" type="datetimeFigureOut">
               <a:rPr lang="en-US" smtClean="0"/>
-              <a:t>3/1/24</a:t>
+              <a:t>3/5/24</a:t>
             </a:fld>
             <a:endParaRPr lang="en-US"/>
           </a:p>
@@ -2551,7 +3122,7 @@
           <a:p>
             <a:fld id="{80FC6068-BAFB-FC44-B9D8-F4B3BB105DE6}" type="datetimeFigureOut">
               <a:rPr lang="en-US" smtClean="0"/>
-              <a:t>3/1/24</a:t>
+              <a:t>3/5/24</a:t>
             </a:fld>
             <a:endParaRPr lang="en-US"/>
           </a:p>
@@ -2963,7 +3534,7 @@
           <a:p>
             <a:fld id="{80FC6068-BAFB-FC44-B9D8-F4B3BB105DE6}" type="datetimeFigureOut">
               <a:rPr lang="en-US" smtClean="0"/>
-              <a:t>3/1/24</a:t>
+              <a:t>3/5/24</a:t>
             </a:fld>
             <a:endParaRPr lang="en-US"/>
           </a:p>
@@ -3104,7 +3675,7 @@
           <a:p>
             <a:fld id="{80FC6068-BAFB-FC44-B9D8-F4B3BB105DE6}" type="datetimeFigureOut">
               <a:rPr lang="en-US" smtClean="0"/>
-              <a:t>3/1/24</a:t>
+              <a:t>3/5/24</a:t>
             </a:fld>
             <a:endParaRPr lang="en-US"/>
           </a:p>
@@ -3217,7 +3788,7 @@
           <a:p>
             <a:fld id="{80FC6068-BAFB-FC44-B9D8-F4B3BB105DE6}" type="datetimeFigureOut">
               <a:rPr lang="en-US" smtClean="0"/>
-              <a:t>3/1/24</a:t>
+              <a:t>3/5/24</a:t>
             </a:fld>
             <a:endParaRPr lang="en-US"/>
           </a:p>
@@ -3528,7 +4099,7 @@
           <a:p>
             <a:fld id="{80FC6068-BAFB-FC44-B9D8-F4B3BB105DE6}" type="datetimeFigureOut">
               <a:rPr lang="en-US" smtClean="0"/>
-              <a:t>3/1/24</a:t>
+              <a:t>3/5/24</a:t>
             </a:fld>
             <a:endParaRPr lang="en-US"/>
           </a:p>
@@ -3816,7 +4387,7 @@
           <a:p>
             <a:fld id="{80FC6068-BAFB-FC44-B9D8-F4B3BB105DE6}" type="datetimeFigureOut">
               <a:rPr lang="en-US" smtClean="0"/>
-              <a:t>3/1/24</a:t>
+              <a:t>3/5/24</a:t>
             </a:fld>
             <a:endParaRPr lang="en-US"/>
           </a:p>
@@ -4057,7 +4628,7 @@
           <a:p>
             <a:fld id="{80FC6068-BAFB-FC44-B9D8-F4B3BB105DE6}" type="datetimeFigureOut">
               <a:rPr lang="en-US" smtClean="0"/>
-              <a:t>3/1/24</a:t>
+              <a:t>3/5/24</a:t>
             </a:fld>
             <a:endParaRPr lang="en-US"/>
           </a:p>
@@ -4704,7 +5275,7 @@
           <a:p>
             <a:r>
               <a:rPr lang="en-US" dirty="0"/>
-              <a:t>Mayo endoscopic/colitis scores similar between datasets, so colitis severity seems similar</a:t>
+              <a:t>Colitis severity seems similar between 2 datasets</a:t>
             </a:r>
           </a:p>
         </p:txBody>
@@ -4731,8 +5302,8 @@
         </p:blipFill>
         <p:spPr>
           <a:xfrm>
-            <a:off x="6476356" y="2626435"/>
-            <a:ext cx="3476941" cy="1839310"/>
+            <a:off x="6476356" y="2626434"/>
+            <a:ext cx="4690079" cy="2481063"/>
           </a:xfrm>
           <a:prstGeom prst="rect">
             <a:avLst/>
@@ -4753,7 +5324,7 @@
         </p:nvSpPr>
         <p:spPr>
           <a:xfrm>
-            <a:off x="7148668" y="2279831"/>
+            <a:off x="7884392" y="2276970"/>
             <a:ext cx="2132315" cy="369332"/>
           </a:xfrm>
           <a:prstGeom prst="rect">
@@ -4836,7 +5407,7 @@
         </p:nvSpPr>
         <p:spPr>
           <a:xfrm>
-            <a:off x="4301944" y="3890094"/>
+            <a:off x="4018165" y="4525771"/>
             <a:ext cx="1460336" cy="369332"/>
           </a:xfrm>
           <a:prstGeom prst="rect">
@@ -4879,8 +5450,8 @@
         </p:blipFill>
         <p:spPr>
           <a:xfrm>
-            <a:off x="588849" y="5026193"/>
-            <a:ext cx="2806262" cy="189987"/>
+            <a:off x="-33837" y="5976419"/>
+            <a:ext cx="3930870" cy="266125"/>
           </a:xfrm>
           <a:prstGeom prst="rect">
             <a:avLst/>
@@ -4909,8 +5480,8 @@
         </p:blipFill>
         <p:spPr>
           <a:xfrm>
-            <a:off x="588849" y="2655008"/>
-            <a:ext cx="2806262" cy="2465223"/>
+            <a:off x="-33837" y="2655430"/>
+            <a:ext cx="3930870" cy="3453160"/>
           </a:xfrm>
           <a:prstGeom prst="rect">
             <a:avLst/>
@@ -4939,8 +5510,8 @@
         </p:blipFill>
         <p:spPr>
           <a:xfrm>
-            <a:off x="3788244" y="4280338"/>
-            <a:ext cx="2487737" cy="2465224"/>
+            <a:off x="3897034" y="4938712"/>
+            <a:ext cx="1822924" cy="1806427"/>
           </a:xfrm>
           <a:prstGeom prst="rect">
             <a:avLst/>
@@ -4969,7 +5540,7 @@
         </p:blipFill>
         <p:spPr>
           <a:xfrm>
-            <a:off x="7275786" y="5232320"/>
+            <a:off x="6750268" y="5232320"/>
             <a:ext cx="4916214" cy="1625680"/>
           </a:xfrm>
           <a:prstGeom prst="rect">
@@ -5330,6 +5901,41 @@
           </a:p>
         </p:txBody>
       </p:sp>
+      <p:sp>
+        <p:nvSpPr>
+          <p:cNvPr id="5" name="TextBox 4">
+            <a:extLst>
+              <a:ext uri="{FF2B5EF4-FFF2-40B4-BE49-F238E27FC236}">
+                <a16:creationId xmlns:a16="http://schemas.microsoft.com/office/drawing/2014/main" id="{5B8883FB-D7AE-D02F-BFC4-69402C0C5F94}"/>
+              </a:ext>
+            </a:extLst>
+          </p:cNvPr>
+          <p:cNvSpPr txBox="1"/>
+          <p:nvPr/>
+        </p:nvSpPr>
+        <p:spPr>
+          <a:xfrm rot="16200000">
+            <a:off x="1458629" y="4573607"/>
+            <a:ext cx="546945" cy="369332"/>
+          </a:xfrm>
+          <a:prstGeom prst="rect">
+            <a:avLst/>
+          </a:prstGeom>
+          <a:noFill/>
+        </p:spPr>
+        <p:txBody>
+          <a:bodyPr wrap="none" rtlCol="0">
+            <a:spAutoFit/>
+          </a:bodyPr>
+          <a:lstStyle/>
+          <a:p>
+            <a:r>
+              <a:rPr lang="en-US" dirty="0"/>
+              <a:t>TRB</a:t>
+            </a:r>
+          </a:p>
+        </p:txBody>
+      </p:sp>
     </p:spTree>
     <p:extLst>
       <p:ext uri="{BB962C8B-B14F-4D97-AF65-F5344CB8AC3E}">
@@ -5384,8 +5990,8 @@
         </p:nvSpPr>
         <p:spPr>
           <a:xfrm>
-            <a:off x="838200" y="593725"/>
-            <a:ext cx="3561080" cy="1325563"/>
+            <a:off x="838199" y="593725"/>
+            <a:ext cx="10292255" cy="1325563"/>
           </a:xfrm>
         </p:spPr>
         <p:txBody>
@@ -5396,7 +6002,662 @@
           <a:p>
             <a:r>
               <a:rPr lang="en-US" dirty="0"/>
-              <a:t>Conclusions</a:t>
+              <a:t>IL-6 potentially associated with </a:t>
+            </a:r>
+            <a:r>
+              <a:rPr lang="en-US" dirty="0" err="1"/>
+              <a:t>irAEs</a:t>
+            </a:r>
+            <a:endParaRPr lang="en-US" i="1" dirty="0"/>
+          </a:p>
+        </p:txBody>
+      </p:sp>
+      <p:sp>
+        <p:nvSpPr>
+          <p:cNvPr id="18" name="Content Placeholder 2">
+            <a:extLst>
+              <a:ext uri="{FF2B5EF4-FFF2-40B4-BE49-F238E27FC236}">
+                <a16:creationId xmlns:a16="http://schemas.microsoft.com/office/drawing/2014/main" id="{27C19DE5-F18B-2A0D-8666-D45CCC13B6DB}"/>
+              </a:ext>
+            </a:extLst>
+          </p:cNvPr>
+          <p:cNvSpPr>
+            <a:spLocks noGrp="1"/>
+          </p:cNvSpPr>
+          <p:nvPr>
+            <p:ph idx="1"/>
+          </p:nvPr>
+        </p:nvSpPr>
+        <p:spPr>
+          <a:xfrm>
+            <a:off x="838200" y="1919289"/>
+            <a:ext cx="10612120" cy="4623402"/>
+          </a:xfrm>
+        </p:spPr>
+        <p:txBody>
+          <a:bodyPr>
+            <a:normAutofit/>
+          </a:bodyPr>
+          <a:lstStyle/>
+          <a:p>
+            <a:r>
+              <a:rPr lang="en-US" dirty="0"/>
+              <a:t>Systemically, higher IL-6 levels seem to be associated with </a:t>
+            </a:r>
+            <a:r>
+              <a:rPr lang="en-US" dirty="0" err="1"/>
+              <a:t>irAEs</a:t>
+            </a:r>
+            <a:r>
+              <a:rPr lang="en-US" dirty="0"/>
+              <a:t> (PMID36367776, PMID33643899)</a:t>
+            </a:r>
+          </a:p>
+          <a:p>
+            <a:r>
+              <a:rPr lang="en-US" dirty="0"/>
+              <a:t>At barrier tissue </a:t>
+            </a:r>
+            <a:r>
+              <a:rPr lang="en-US" dirty="0" err="1"/>
+              <a:t>irAE</a:t>
+            </a:r>
+            <a:r>
+              <a:rPr lang="en-US" dirty="0"/>
+              <a:t> sites, IL-6 also seems implicated (PMID35537412, PMID33060784)</a:t>
+            </a:r>
+          </a:p>
+          <a:p>
+            <a:r>
+              <a:rPr lang="en-US" dirty="0"/>
+              <a:t>IL-6 inhibitors may help prevent severe </a:t>
+            </a:r>
+            <a:r>
+              <a:rPr lang="en-US" dirty="0" err="1"/>
+              <a:t>irAEs</a:t>
+            </a:r>
+            <a:r>
+              <a:rPr lang="en-US" dirty="0"/>
+              <a:t> (PMID36198831)</a:t>
+            </a:r>
+          </a:p>
+        </p:txBody>
+      </p:sp>
+    </p:spTree>
+    <p:extLst>
+      <p:ext uri="{BB962C8B-B14F-4D97-AF65-F5344CB8AC3E}">
+        <p14:creationId xmlns:p14="http://schemas.microsoft.com/office/powerpoint/2010/main" val="840655820"/>
+      </p:ext>
+    </p:extLst>
+  </p:cSld>
+  <p:clrMapOvr>
+    <a:masterClrMapping/>
+  </p:clrMapOvr>
+</p:sld>
+</file>
+
+<file path=ppt/slides/slide6.xml><?xml version="1.0" encoding="utf-8"?>
+<p:sld xmlns:a="http://schemas.openxmlformats.org/drawingml/2006/main" xmlns:r="http://schemas.openxmlformats.org/officeDocument/2006/relationships" xmlns:p="http://schemas.openxmlformats.org/presentationml/2006/main">
+  <p:cSld>
+    <p:spTree>
+      <p:nvGrpSpPr>
+        <p:cNvPr id="1" name="">
+          <a:extLst>
+            <a:ext uri="{FF2B5EF4-FFF2-40B4-BE49-F238E27FC236}">
+              <a16:creationId xmlns:a16="http://schemas.microsoft.com/office/drawing/2014/main" id="{5F63F271-7169-1115-1EF3-CE3BF477816E}"/>
+            </a:ext>
+          </a:extLst>
+        </p:cNvPr>
+        <p:cNvGrpSpPr/>
+        <p:nvPr/>
+      </p:nvGrpSpPr>
+      <p:grpSpPr>
+        <a:xfrm>
+          <a:off x="0" y="0"/>
+          <a:ext cx="0" cy="0"/>
+          <a:chOff x="0" y="0"/>
+          <a:chExt cx="0" cy="0"/>
+        </a:xfrm>
+      </p:grpSpPr>
+      <p:sp>
+        <p:nvSpPr>
+          <p:cNvPr id="2" name="Title 1">
+            <a:extLst>
+              <a:ext uri="{FF2B5EF4-FFF2-40B4-BE49-F238E27FC236}">
+                <a16:creationId xmlns:a16="http://schemas.microsoft.com/office/drawing/2014/main" id="{FA6F45DB-D64D-9355-7CD2-66B994D6E22E}"/>
+              </a:ext>
+            </a:extLst>
+          </p:cNvPr>
+          <p:cNvSpPr>
+            <a:spLocks noGrp="1"/>
+          </p:cNvSpPr>
+          <p:nvPr>
+            <p:ph type="title"/>
+          </p:nvPr>
+        </p:nvSpPr>
+        <p:spPr>
+          <a:xfrm>
+            <a:off x="838199" y="593725"/>
+            <a:ext cx="10292255" cy="1325563"/>
+          </a:xfrm>
+        </p:spPr>
+        <p:txBody>
+          <a:bodyPr>
+            <a:normAutofit fontScale="90000"/>
+          </a:bodyPr>
+          <a:lstStyle/>
+          <a:p>
+            <a:r>
+              <a:rPr lang="en-US" dirty="0"/>
+              <a:t>Using an alternative cell typing method (</a:t>
+            </a:r>
+            <a:r>
+              <a:rPr lang="en-US" dirty="0" err="1"/>
+              <a:t>SingleR</a:t>
+            </a:r>
+            <a:r>
+              <a:rPr lang="en-US" dirty="0"/>
+              <a:t>, motivated by looking for Th subsets), see memory Tregs higher in colitis tissue in both datasets</a:t>
+            </a:r>
+            <a:endParaRPr lang="en-US" i="1" dirty="0"/>
+          </a:p>
+        </p:txBody>
+      </p:sp>
+      <p:sp>
+        <p:nvSpPr>
+          <p:cNvPr id="11" name="TextBox 10">
+            <a:extLst>
+              <a:ext uri="{FF2B5EF4-FFF2-40B4-BE49-F238E27FC236}">
+                <a16:creationId xmlns:a16="http://schemas.microsoft.com/office/drawing/2014/main" id="{F25D2D4D-DF00-679C-51A3-2EF3730002F7}"/>
+              </a:ext>
+            </a:extLst>
+          </p:cNvPr>
+          <p:cNvSpPr txBox="1"/>
+          <p:nvPr/>
+        </p:nvSpPr>
+        <p:spPr>
+          <a:xfrm>
+            <a:off x="3836693" y="6504434"/>
+            <a:ext cx="3741730" cy="369332"/>
+          </a:xfrm>
+          <a:prstGeom prst="rect">
+            <a:avLst/>
+          </a:prstGeom>
+          <a:noFill/>
+        </p:spPr>
+        <p:txBody>
+          <a:bodyPr wrap="none" rtlCol="0">
+            <a:spAutoFit/>
+          </a:bodyPr>
+          <a:lstStyle/>
+          <a:p>
+            <a:r>
+              <a:rPr lang="en-US" dirty="0"/>
+              <a:t>Wilcoxon rank sum test.</a:t>
+            </a:r>
+            <a:r>
+              <a:rPr lang="en-US" dirty="0">
+                <a:latin typeface="Calibri" panose="020F0502020204030204" pitchFamily="34" charset="0"/>
+                <a:cs typeface="Times New Roman" panose="02020603050405020304" pitchFamily="18" charset="0"/>
+              </a:rPr>
+              <a:t> </a:t>
+            </a:r>
+            <a:r>
+              <a:rPr lang="en-US" sz="1800" dirty="0">
+                <a:effectLst/>
+                <a:latin typeface="Calibri" panose="020F0502020204030204" pitchFamily="34" charset="0"/>
+                <a:ea typeface="Calibri" panose="020F0502020204030204" pitchFamily="34" charset="0"/>
+                <a:cs typeface="Times New Roman" panose="02020603050405020304" pitchFamily="18" charset="0"/>
+              </a:rPr>
+              <a:t>*, </a:t>
+            </a:r>
+            <a:r>
+              <a:rPr lang="en-US" sz="1800" dirty="0" err="1">
+                <a:effectLst/>
+                <a:latin typeface="Calibri" panose="020F0502020204030204" pitchFamily="34" charset="0"/>
+                <a:ea typeface="Calibri" panose="020F0502020204030204" pitchFamily="34" charset="0"/>
+                <a:cs typeface="Times New Roman" panose="02020603050405020304" pitchFamily="18" charset="0"/>
+              </a:rPr>
+              <a:t>padj</a:t>
+            </a:r>
+            <a:r>
+              <a:rPr lang="en-US" sz="1800" dirty="0">
+                <a:effectLst/>
+                <a:latin typeface="Calibri" panose="020F0502020204030204" pitchFamily="34" charset="0"/>
+                <a:ea typeface="Calibri" panose="020F0502020204030204" pitchFamily="34" charset="0"/>
+                <a:cs typeface="Times New Roman" panose="02020603050405020304" pitchFamily="18" charset="0"/>
+              </a:rPr>
+              <a:t> &lt; 0.05</a:t>
+            </a:r>
+            <a:endParaRPr lang="en-US" b="0" i="0" u="none" strike="noStrike" dirty="0">
+              <a:solidFill>
+                <a:srgbClr val="212121"/>
+              </a:solidFill>
+              <a:effectLst/>
+              <a:latin typeface="Cambria" panose="02040503050406030204" pitchFamily="18" charset="0"/>
+            </a:endParaRPr>
+          </a:p>
+        </p:txBody>
+      </p:sp>
+      <p:pic>
+        <p:nvPicPr>
+          <p:cNvPr id="3" name="Picture 2">
+            <a:extLst>
+              <a:ext uri="{FF2B5EF4-FFF2-40B4-BE49-F238E27FC236}">
+                <a16:creationId xmlns:a16="http://schemas.microsoft.com/office/drawing/2014/main" id="{4508D578-3AF0-4E82-A2C7-EDF29243C898}"/>
+              </a:ext>
+            </a:extLst>
+          </p:cNvPr>
+          <p:cNvPicPr>
+            <a:picLocks noChangeAspect="1"/>
+          </p:cNvPicPr>
+          <p:nvPr/>
+        </p:nvPicPr>
+        <p:blipFill>
+          <a:blip r:embed="rId3"/>
+          <a:stretch>
+            <a:fillRect/>
+          </a:stretch>
+        </p:blipFill>
+        <p:spPr>
+          <a:xfrm>
+            <a:off x="0" y="2307365"/>
+            <a:ext cx="6096000" cy="3712861"/>
+          </a:xfrm>
+          <a:prstGeom prst="rect">
+            <a:avLst/>
+          </a:prstGeom>
+        </p:spPr>
+      </p:pic>
+      <p:sp>
+        <p:nvSpPr>
+          <p:cNvPr id="5" name="TextBox 4">
+            <a:extLst>
+              <a:ext uri="{FF2B5EF4-FFF2-40B4-BE49-F238E27FC236}">
+                <a16:creationId xmlns:a16="http://schemas.microsoft.com/office/drawing/2014/main" id="{9EFD7169-72F0-7832-1BF9-529C26D58F02}"/>
+              </a:ext>
+            </a:extLst>
+          </p:cNvPr>
+          <p:cNvSpPr txBox="1"/>
+          <p:nvPr/>
+        </p:nvSpPr>
+        <p:spPr>
+          <a:xfrm>
+            <a:off x="1441134" y="2517961"/>
+            <a:ext cx="235358" cy="369332"/>
+          </a:xfrm>
+          <a:prstGeom prst="rect">
+            <a:avLst/>
+          </a:prstGeom>
+          <a:noFill/>
+        </p:spPr>
+        <p:txBody>
+          <a:bodyPr wrap="square" rtlCol="0">
+            <a:spAutoFit/>
+          </a:bodyPr>
+          <a:lstStyle/>
+          <a:p>
+            <a:r>
+              <a:rPr lang="en-US" dirty="0"/>
+              <a:t>*</a:t>
+            </a:r>
+          </a:p>
+        </p:txBody>
+      </p:sp>
+      <p:sp>
+        <p:nvSpPr>
+          <p:cNvPr id="6" name="TextBox 5">
+            <a:extLst>
+              <a:ext uri="{FF2B5EF4-FFF2-40B4-BE49-F238E27FC236}">
+                <a16:creationId xmlns:a16="http://schemas.microsoft.com/office/drawing/2014/main" id="{3B048234-B82A-A3C0-0507-0623B17D6481}"/>
+              </a:ext>
+            </a:extLst>
+          </p:cNvPr>
+          <p:cNvSpPr txBox="1"/>
+          <p:nvPr/>
+        </p:nvSpPr>
+        <p:spPr>
+          <a:xfrm>
+            <a:off x="2193197" y="2381741"/>
+            <a:ext cx="597449" cy="738664"/>
+          </a:xfrm>
+          <a:prstGeom prst="rect">
+            <a:avLst/>
+          </a:prstGeom>
+          <a:noFill/>
+        </p:spPr>
+        <p:txBody>
+          <a:bodyPr wrap="square" rtlCol="0">
+            <a:spAutoFit/>
+          </a:bodyPr>
+          <a:lstStyle/>
+          <a:p>
+            <a:r>
+              <a:rPr lang="en-US" sz="1400" dirty="0" err="1"/>
+              <a:t>padj</a:t>
+            </a:r>
+            <a:r>
+              <a:rPr lang="en-US" sz="1400" dirty="0"/>
+              <a:t> =</a:t>
+            </a:r>
+          </a:p>
+          <a:p>
+            <a:r>
+              <a:rPr lang="en-US" sz="1400" dirty="0"/>
+              <a:t>0.09</a:t>
+            </a:r>
+          </a:p>
+        </p:txBody>
+      </p:sp>
+      <p:sp>
+        <p:nvSpPr>
+          <p:cNvPr id="12" name="TextBox 11">
+            <a:extLst>
+              <a:ext uri="{FF2B5EF4-FFF2-40B4-BE49-F238E27FC236}">
+                <a16:creationId xmlns:a16="http://schemas.microsoft.com/office/drawing/2014/main" id="{BE07FC52-903F-4145-262B-AE3F3F24DA6A}"/>
+              </a:ext>
+            </a:extLst>
+          </p:cNvPr>
+          <p:cNvSpPr txBox="1"/>
+          <p:nvPr/>
+        </p:nvSpPr>
+        <p:spPr>
+          <a:xfrm>
+            <a:off x="3434522" y="2381741"/>
+            <a:ext cx="597449" cy="738664"/>
+          </a:xfrm>
+          <a:prstGeom prst="rect">
+            <a:avLst/>
+          </a:prstGeom>
+          <a:noFill/>
+        </p:spPr>
+        <p:txBody>
+          <a:bodyPr wrap="square" rtlCol="0">
+            <a:spAutoFit/>
+          </a:bodyPr>
+          <a:lstStyle/>
+          <a:p>
+            <a:r>
+              <a:rPr lang="en-US" sz="1400" dirty="0" err="1"/>
+              <a:t>padj</a:t>
+            </a:r>
+            <a:r>
+              <a:rPr lang="en-US" sz="1400" dirty="0"/>
+              <a:t> =</a:t>
+            </a:r>
+          </a:p>
+          <a:p>
+            <a:r>
+              <a:rPr lang="en-US" sz="1400" dirty="0"/>
+              <a:t>0.06</a:t>
+            </a:r>
+          </a:p>
+        </p:txBody>
+      </p:sp>
+      <p:pic>
+        <p:nvPicPr>
+          <p:cNvPr id="13" name="Picture 12">
+            <a:extLst>
+              <a:ext uri="{FF2B5EF4-FFF2-40B4-BE49-F238E27FC236}">
+                <a16:creationId xmlns:a16="http://schemas.microsoft.com/office/drawing/2014/main" id="{B916859B-21DD-D3ED-5B04-F9858E073AAC}"/>
+              </a:ext>
+            </a:extLst>
+          </p:cNvPr>
+          <p:cNvPicPr>
+            <a:picLocks noChangeAspect="1"/>
+          </p:cNvPicPr>
+          <p:nvPr/>
+        </p:nvPicPr>
+        <p:blipFill>
+          <a:blip r:embed="rId4"/>
+          <a:stretch>
+            <a:fillRect/>
+          </a:stretch>
+        </p:blipFill>
+        <p:spPr>
+          <a:xfrm>
+            <a:off x="5917173" y="2303642"/>
+            <a:ext cx="6208986" cy="3716584"/>
+          </a:xfrm>
+          <a:prstGeom prst="rect">
+            <a:avLst/>
+          </a:prstGeom>
+        </p:spPr>
+      </p:pic>
+      <p:sp>
+        <p:nvSpPr>
+          <p:cNvPr id="14" name="TextBox 13">
+            <a:extLst>
+              <a:ext uri="{FF2B5EF4-FFF2-40B4-BE49-F238E27FC236}">
+                <a16:creationId xmlns:a16="http://schemas.microsoft.com/office/drawing/2014/main" id="{DCA834E7-9FB4-EA6B-62E8-D20A0AC20746}"/>
+              </a:ext>
+            </a:extLst>
+          </p:cNvPr>
+          <p:cNvSpPr txBox="1"/>
+          <p:nvPr/>
+        </p:nvSpPr>
+        <p:spPr>
+          <a:xfrm>
+            <a:off x="1862865" y="2039420"/>
+            <a:ext cx="1938351" cy="369332"/>
+          </a:xfrm>
+          <a:prstGeom prst="rect">
+            <a:avLst/>
+          </a:prstGeom>
+          <a:noFill/>
+        </p:spPr>
+        <p:txBody>
+          <a:bodyPr wrap="none" rtlCol="0">
+            <a:spAutoFit/>
+          </a:bodyPr>
+          <a:lstStyle/>
+          <a:p>
+            <a:r>
+              <a:rPr lang="en-US" dirty="0" err="1"/>
+              <a:t>Luoma</a:t>
+            </a:r>
+            <a:r>
+              <a:rPr lang="en-US" dirty="0"/>
+              <a:t> (2020), </a:t>
+            </a:r>
+            <a:r>
+              <a:rPr lang="en-US" i="1" dirty="0"/>
+              <a:t>Cell</a:t>
+            </a:r>
+          </a:p>
+        </p:txBody>
+      </p:sp>
+      <p:sp>
+        <p:nvSpPr>
+          <p:cNvPr id="15" name="TextBox 14">
+            <a:extLst>
+              <a:ext uri="{FF2B5EF4-FFF2-40B4-BE49-F238E27FC236}">
+                <a16:creationId xmlns:a16="http://schemas.microsoft.com/office/drawing/2014/main" id="{6373E0BB-6F83-518C-317E-8260B5306E13}"/>
+              </a:ext>
+            </a:extLst>
+          </p:cNvPr>
+          <p:cNvSpPr txBox="1"/>
+          <p:nvPr/>
+        </p:nvSpPr>
+        <p:spPr>
+          <a:xfrm>
+            <a:off x="7958865" y="2012409"/>
+            <a:ext cx="2367956" cy="369332"/>
+          </a:xfrm>
+          <a:prstGeom prst="rect">
+            <a:avLst/>
+          </a:prstGeom>
+          <a:noFill/>
+        </p:spPr>
+        <p:txBody>
+          <a:bodyPr wrap="none" rtlCol="0">
+            <a:spAutoFit/>
+          </a:bodyPr>
+          <a:lstStyle/>
+          <a:p>
+            <a:r>
+              <a:rPr lang="en-US" dirty="0"/>
+              <a:t>Thomas (2021), </a:t>
+            </a:r>
+            <a:r>
+              <a:rPr lang="en-US" i="1" dirty="0" err="1"/>
+              <a:t>bioRxiv</a:t>
+            </a:r>
+            <a:endParaRPr lang="en-US" i="1" dirty="0"/>
+          </a:p>
+        </p:txBody>
+      </p:sp>
+      <p:sp>
+        <p:nvSpPr>
+          <p:cNvPr id="16" name="TextBox 15">
+            <a:extLst>
+              <a:ext uri="{FF2B5EF4-FFF2-40B4-BE49-F238E27FC236}">
+                <a16:creationId xmlns:a16="http://schemas.microsoft.com/office/drawing/2014/main" id="{D294F2A8-5FC9-4540-266D-4A742C690141}"/>
+              </a:ext>
+            </a:extLst>
+          </p:cNvPr>
+          <p:cNvSpPr txBox="1"/>
+          <p:nvPr/>
+        </p:nvSpPr>
+        <p:spPr>
+          <a:xfrm>
+            <a:off x="7358307" y="2521316"/>
+            <a:ext cx="235358" cy="369332"/>
+          </a:xfrm>
+          <a:prstGeom prst="rect">
+            <a:avLst/>
+          </a:prstGeom>
+          <a:noFill/>
+        </p:spPr>
+        <p:txBody>
+          <a:bodyPr wrap="square" rtlCol="0">
+            <a:spAutoFit/>
+          </a:bodyPr>
+          <a:lstStyle/>
+          <a:p>
+            <a:r>
+              <a:rPr lang="en-US" dirty="0"/>
+              <a:t>*</a:t>
+            </a:r>
+          </a:p>
+        </p:txBody>
+      </p:sp>
+      <p:sp>
+        <p:nvSpPr>
+          <p:cNvPr id="17" name="TextBox 16">
+            <a:extLst>
+              <a:ext uri="{FF2B5EF4-FFF2-40B4-BE49-F238E27FC236}">
+                <a16:creationId xmlns:a16="http://schemas.microsoft.com/office/drawing/2014/main" id="{F48B7C8A-D167-350D-2B7A-7639DFEBDC20}"/>
+              </a:ext>
+            </a:extLst>
+          </p:cNvPr>
+          <p:cNvSpPr txBox="1"/>
+          <p:nvPr/>
+        </p:nvSpPr>
+        <p:spPr>
+          <a:xfrm>
+            <a:off x="2491921" y="5881360"/>
+            <a:ext cx="7232108" cy="523220"/>
+          </a:xfrm>
+          <a:prstGeom prst="rect">
+            <a:avLst/>
+          </a:prstGeom>
+          <a:noFill/>
+        </p:spPr>
+        <p:txBody>
+          <a:bodyPr wrap="none" rtlCol="0">
+            <a:spAutoFit/>
+          </a:bodyPr>
+          <a:lstStyle/>
+          <a:p>
+            <a:r>
+              <a:rPr lang="en-US" sz="1400" dirty="0"/>
+              <a:t>What </a:t>
+            </a:r>
+            <a:r>
+              <a:rPr lang="en-US" sz="1400" dirty="0" err="1"/>
+              <a:t>SingleR</a:t>
+            </a:r>
+            <a:r>
+              <a:rPr lang="en-US" sz="1400" dirty="0"/>
+              <a:t> calls memory Treg is mostly called CD4 TCM (~50-75%) or Treg (~15-30%) by Seurat</a:t>
+            </a:r>
+          </a:p>
+          <a:p>
+            <a:r>
+              <a:rPr lang="en-US" sz="1400" dirty="0"/>
+              <a:t>Cell typing scores don’t seem too bad…</a:t>
+            </a:r>
+          </a:p>
+        </p:txBody>
+      </p:sp>
+    </p:spTree>
+    <p:extLst>
+      <p:ext uri="{BB962C8B-B14F-4D97-AF65-F5344CB8AC3E}">
+        <p14:creationId xmlns:p14="http://schemas.microsoft.com/office/powerpoint/2010/main" val="2411882250"/>
+      </p:ext>
+    </p:extLst>
+  </p:cSld>
+  <p:clrMapOvr>
+    <a:masterClrMapping/>
+  </p:clrMapOvr>
+</p:sld>
+</file>
+
+<file path=ppt/slides/slide7.xml><?xml version="1.0" encoding="utf-8"?>
+<p:sld xmlns:a="http://schemas.openxmlformats.org/drawingml/2006/main" xmlns:r="http://schemas.openxmlformats.org/officeDocument/2006/relationships" xmlns:p="http://schemas.openxmlformats.org/presentationml/2006/main">
+  <p:cSld>
+    <p:spTree>
+      <p:nvGrpSpPr>
+        <p:cNvPr id="1" name="">
+          <a:extLst>
+            <a:ext uri="{FF2B5EF4-FFF2-40B4-BE49-F238E27FC236}">
+              <a16:creationId xmlns:a16="http://schemas.microsoft.com/office/drawing/2014/main" id="{5F63F271-7169-1115-1EF3-CE3BF477816E}"/>
+            </a:ext>
+          </a:extLst>
+        </p:cNvPr>
+        <p:cNvGrpSpPr/>
+        <p:nvPr/>
+      </p:nvGrpSpPr>
+      <p:grpSpPr>
+        <a:xfrm>
+          <a:off x="0" y="0"/>
+          <a:ext cx="0" cy="0"/>
+          <a:chOff x="0" y="0"/>
+          <a:chExt cx="0" cy="0"/>
+        </a:xfrm>
+      </p:grpSpPr>
+      <p:sp>
+        <p:nvSpPr>
+          <p:cNvPr id="2" name="Title 1">
+            <a:extLst>
+              <a:ext uri="{FF2B5EF4-FFF2-40B4-BE49-F238E27FC236}">
+                <a16:creationId xmlns:a16="http://schemas.microsoft.com/office/drawing/2014/main" id="{FA6F45DB-D64D-9355-7CD2-66B994D6E22E}"/>
+              </a:ext>
+            </a:extLst>
+          </p:cNvPr>
+          <p:cNvSpPr>
+            <a:spLocks noGrp="1"/>
+          </p:cNvSpPr>
+          <p:nvPr>
+            <p:ph type="title"/>
+          </p:nvPr>
+        </p:nvSpPr>
+        <p:spPr>
+          <a:xfrm>
+            <a:off x="838199" y="593725"/>
+            <a:ext cx="8389883" cy="1325563"/>
+          </a:xfrm>
+        </p:spPr>
+        <p:txBody>
+          <a:bodyPr>
+            <a:normAutofit/>
+          </a:bodyPr>
+          <a:lstStyle/>
+          <a:p>
+            <a:r>
+              <a:rPr lang="en-US" dirty="0"/>
+              <a:t>Conclusions (new ones bolded)</a:t>
             </a:r>
           </a:p>
         </p:txBody>
@@ -5435,7 +6696,7 @@
             </a:pPr>
             <a:r>
               <a:rPr lang="en-US" dirty="0"/>
-              <a:t>Joined analysis results</a:t>
+              <a:t>Joined analysis</a:t>
             </a:r>
           </a:p>
           <a:p>
@@ -5445,6 +6706,16 @@
             </a:pPr>
             <a:r>
               <a:rPr lang="en-US" dirty="0"/>
+              <a:t>Germline-ness results</a:t>
+            </a:r>
+          </a:p>
+          <a:p>
+            <a:pPr marL="1428750" lvl="2" indent="-514350">
+              <a:buFont typeface="+mj-lt"/>
+              <a:buAutoNum type="romanUcPeriod"/>
+            </a:pPr>
+            <a:r>
+              <a:rPr lang="en-US" dirty="0"/>
               <a:t>Highly expanded CD8 </a:t>
             </a:r>
             <a:r>
@@ -5461,7 +6732,35 @@
             </a:r>
             <a:r>
               <a:rPr lang="en-US" dirty="0"/>
-              <a:t> dataset though, shown in last week presentation)</a:t>
+              <a:t> dataset though)</a:t>
+            </a:r>
+          </a:p>
+          <a:p>
+            <a:pPr marL="1428750" lvl="2" indent="-514350">
+              <a:buFont typeface="+mj-lt"/>
+              <a:buAutoNum type="romanUcPeriod"/>
+            </a:pPr>
+            <a:r>
+              <a:rPr lang="en-US" b="1" dirty="0"/>
+              <a:t>CD8 </a:t>
+            </a:r>
+            <a:r>
+              <a:rPr lang="en-US" b="1" dirty="0" err="1"/>
+              <a:t>Trms</a:t>
+            </a:r>
+            <a:r>
+              <a:rPr lang="en-US" b="1" dirty="0"/>
+              <a:t> TRB may be more germline-like in colitis tissue across both datasets</a:t>
+            </a:r>
+          </a:p>
+          <a:p>
+            <a:pPr marL="1428750" lvl="2" indent="-514350">
+              <a:buFont typeface="+mj-lt"/>
+              <a:buAutoNum type="romanUcPeriod"/>
+            </a:pPr>
+            <a:r>
+              <a:rPr lang="en-US" b="1" dirty="0"/>
+              <a:t>CD4 proliferating TRB germline effect opposite in 2 datasets</a:t>
             </a:r>
           </a:p>
           <a:p>
@@ -5471,25 +6770,47 @@
             </a:pPr>
             <a:r>
               <a:rPr lang="en-US" dirty="0"/>
-              <a:t>CD8 </a:t>
-            </a:r>
-            <a:r>
-              <a:rPr lang="en-US" dirty="0" err="1"/>
-              <a:t>Trms</a:t>
-            </a:r>
+              <a:t>Cell abundance results</a:t>
+            </a:r>
+          </a:p>
+          <a:p>
+            <a:pPr marL="1428750" lvl="2" indent="-514350">
+              <a:buFont typeface="+mj-lt"/>
+              <a:buAutoNum type="romanUcPeriod"/>
+            </a:pPr>
             <a:r>
               <a:rPr lang="en-US" dirty="0"/>
-              <a:t> TRB may be more germline-like in colitis tissue across both datasets</a:t>
-            </a:r>
-          </a:p>
-          <a:p>
-            <a:pPr marL="971550" lvl="1" indent="-514350">
+              <a:t>CD4 TEMs less abundant in colitis tissue</a:t>
+            </a:r>
+          </a:p>
+          <a:p>
+            <a:pPr marL="1428750" lvl="2" indent="-514350">
               <a:buFont typeface="+mj-lt"/>
-              <a:buAutoNum type="alphaLcPeriod"/>
+              <a:buAutoNum type="romanUcPeriod"/>
             </a:pPr>
             <a:r>
               <a:rPr lang="en-US" dirty="0"/>
-              <a:t>CD4 proliferating TRB germline effect opposite in 2 datasets</a:t>
+              <a:t>CD4 proliferating T cells more abundant in colitis tissue</a:t>
+            </a:r>
+          </a:p>
+          <a:p>
+            <a:pPr marL="1428750" lvl="2" indent="-514350">
+              <a:buFont typeface="+mj-lt"/>
+              <a:buAutoNum type="romanUcPeriod"/>
+            </a:pPr>
+            <a:r>
+              <a:rPr lang="en-US" dirty="0"/>
+              <a:t>CD4 TCMs may be more abundant in colitis tissue (substantial label overlap w/ memory Treg)</a:t>
+            </a:r>
+          </a:p>
+          <a:p>
+            <a:pPr marL="1428750" lvl="2" indent="-514350">
+              <a:buFont typeface="+mj-lt"/>
+              <a:buAutoNum type="romanUcPeriod"/>
+            </a:pPr>
+            <a:r>
+              <a:rPr lang="en-US" b="1" dirty="0"/>
+              <a:t>Memory Tregs may be more abundant in colitis tissue (substantial label overlap w/ CD4 TCM)</a:t>
             </a:r>
           </a:p>
         </p:txBody>
@@ -5507,7 +6828,7 @@
 </p:sld>
 </file>
 
-<file path=ppt/slides/slide6.xml><?xml version="1.0" encoding="utf-8"?>
+<file path=ppt/slides/slide8.xml><?xml version="1.0" encoding="utf-8"?>
 <p:sld xmlns:a="http://schemas.openxmlformats.org/drawingml/2006/main" xmlns:r="http://schemas.openxmlformats.org/officeDocument/2006/relationships" xmlns:p="http://schemas.openxmlformats.org/presentationml/2006/main">
   <p:cSld>
     <p:spTree>

</xml_diff>

<commit_message>
Add dice ref notes
</commit_message>
<xml_diff>
--- a/presentations/weekly_meetings/3_7_24.pptx
+++ b/presentations/weekly_meetings/3_7_24.pptx
@@ -1191,6 +1191,16 @@
         <p:txBody>
           <a:bodyPr/>
           <a:lstStyle/>
+          <a:p>
+            <a:r>
+              <a:rPr lang="en-US" sz="1200"/>
+              <a:t>Dice: # normalized expression values of 1561 bulk RNA-seq samples generated by DICE from pure populations of human immune cells</a:t>
+            </a:r>
+            <a:endParaRPr lang="en-US" sz="1200" dirty="0"/>
+          </a:p>
+          <a:p>
+            <a:endParaRPr lang="en-US" sz="1200" dirty="0"/>
+          </a:p>
           <a:p>
             <a:r>
               <a:rPr lang="en-US" sz="1200" dirty="0"/>

</xml_diff>